<commit_message>
last push before presintation
</commit_message>
<xml_diff>
--- a/Documentation/CopycatSimonsSymphonypresintation.pptx
+++ b/Documentation/CopycatSimonsSymphonypresintation.pptx
@@ -1663,6 +1663,151 @@
                 </a:solidFill>
               </a:rPr>
               <a:t>: Utilized to sort an array, considering custom comparison logic.</a:t>
+            </a:r>
+            <a:br>
+              <a:rPr lang="en" sz="1300">
+                <a:solidFill>
+                  <a:srgbClr val="1D1C1D"/>
+                </a:solidFill>
+              </a:rPr>
+            </a:br>
+            <a:r>
+              <a:rPr lang="en" sz="1300">
+                <a:solidFill>
+                  <a:srgbClr val="188038"/>
+                </a:solidFill>
+              </a:rPr>
+              <a:t>JSON.parse(): </a:t>
+            </a:r>
+            <a:r>
+              <a:rPr lang="en" sz="1300">
+                <a:solidFill>
+                  <a:srgbClr val="1D1C1D"/>
+                </a:solidFill>
+              </a:rPr>
+              <a:t>This function is used to parse a JSON string, converting it into a JavaScript object for further manipulation or usage.</a:t>
+            </a:r>
+            <a:endParaRPr sz="1300">
+              <a:solidFill>
+                <a:srgbClr val="1D1C1D"/>
+              </a:solidFill>
+            </a:endParaRPr>
+          </a:p>
+          <a:p>
+            <a:pPr indent="-228600" lvl="0" marL="723900" rtl="0" algn="l">
+              <a:lnSpc>
+                <a:spcPct val="115000"/>
+              </a:lnSpc>
+              <a:spcBef>
+                <a:spcPts val="0"/>
+              </a:spcBef>
+              <a:spcAft>
+                <a:spcPts val="0"/>
+              </a:spcAft>
+              <a:buClr>
+                <a:srgbClr val="1D1C1D"/>
+              </a:buClr>
+              <a:buSzPts val="1300"/>
+              <a:buNone/>
+            </a:pPr>
+            <a:r>
+              <a:rPr lang="en" sz="1300">
+                <a:solidFill>
+                  <a:srgbClr val="188038"/>
+                </a:solidFill>
+              </a:rPr>
+              <a:t>localStorage.getItem(""):</a:t>
+            </a:r>
+            <a:r>
+              <a:rPr lang="en" sz="1300">
+                <a:solidFill>
+                  <a:srgbClr val="1D1C1D"/>
+                </a:solidFill>
+              </a:rPr>
+              <a:t> This code is employed to retrieve a value from the web browser's local storage based on a specific key.</a:t>
+            </a:r>
+            <a:endParaRPr sz="1300">
+              <a:solidFill>
+                <a:srgbClr val="1D1C1D"/>
+              </a:solidFill>
+            </a:endParaRPr>
+          </a:p>
+          <a:p>
+            <a:pPr indent="-228600" lvl="0" marL="723900" rtl="0" algn="l">
+              <a:lnSpc>
+                <a:spcPct val="115000"/>
+              </a:lnSpc>
+              <a:spcBef>
+                <a:spcPts val="0"/>
+              </a:spcBef>
+              <a:spcAft>
+                <a:spcPts val="0"/>
+              </a:spcAft>
+              <a:buClr>
+                <a:srgbClr val="1D1C1D"/>
+              </a:buClr>
+              <a:buSzPts val="1300"/>
+              <a:buNone/>
+            </a:pPr>
+            <a:r>
+              <a:rPr lang="en" sz="1300">
+                <a:solidFill>
+                  <a:srgbClr val="188038"/>
+                </a:solidFill>
+              </a:rPr>
+              <a:t>JSON.stringify(): </a:t>
+            </a:r>
+            <a:r>
+              <a:rPr lang="en" sz="1300">
+                <a:solidFill>
+                  <a:srgbClr val="1D1C1D"/>
+                </a:solidFill>
+              </a:rPr>
+              <a:t>This method is used to convert a JavaScript object into a JSON string, allowing for easy storage or transmission of data.</a:t>
+            </a:r>
+            <a:endParaRPr sz="1300">
+              <a:solidFill>
+                <a:srgbClr val="1D1C1D"/>
+              </a:solidFill>
+            </a:endParaRPr>
+          </a:p>
+          <a:p>
+            <a:pPr indent="0" lvl="0" marL="457200" rtl="0" algn="l">
+              <a:lnSpc>
+                <a:spcPct val="115000"/>
+              </a:lnSpc>
+              <a:spcBef>
+                <a:spcPts val="0"/>
+              </a:spcBef>
+              <a:spcAft>
+                <a:spcPts val="0"/>
+              </a:spcAft>
+              <a:buNone/>
+            </a:pPr>
+            <a:r>
+              <a:t/>
+            </a:r>
+            <a:endParaRPr sz="1300">
+              <a:solidFill>
+                <a:srgbClr val="1D1C1D"/>
+              </a:solidFill>
+            </a:endParaRPr>
+          </a:p>
+          <a:p>
+            <a:pPr indent="0" lvl="0" marL="457200" rtl="0" algn="l">
+              <a:lnSpc>
+                <a:spcPct val="115000"/>
+              </a:lnSpc>
+              <a:spcBef>
+                <a:spcPts val="0"/>
+              </a:spcBef>
+              <a:spcAft>
+                <a:spcPts val="0"/>
+              </a:spcAft>
+              <a:buNone/>
+            </a:pPr>
+            <a:r>
+              <a:t/>
             </a:r>
             <a:endParaRPr sz="1300">
               <a:solidFill>
@@ -8031,7 +8176,7 @@
         </p:nvSpPr>
         <p:spPr>
           <a:xfrm>
-            <a:off x="311700" y="1223913"/>
+            <a:off x="311700" y="1119793"/>
             <a:ext cx="8520600" cy="454800"/>
           </a:xfrm>
           <a:prstGeom prst="rect">
@@ -8083,7 +8228,7 @@
         </p:nvSpPr>
         <p:spPr>
           <a:xfrm>
-            <a:off x="311700" y="1785869"/>
+            <a:off x="311700" y="1681749"/>
             <a:ext cx="8520600" cy="454800"/>
           </a:xfrm>
           <a:prstGeom prst="rect">
@@ -8141,8 +8286,8 @@
         </p:nvSpPr>
         <p:spPr>
           <a:xfrm>
-            <a:off x="2570925" y="1785869"/>
-            <a:ext cx="5108700" cy="1743300"/>
+            <a:off x="2570925" y="1681749"/>
+            <a:ext cx="5108700" cy="2539800"/>
           </a:xfrm>
           <a:prstGeom prst="rect">
             <a:avLst/>
@@ -8324,7 +8469,7 @@
                 <a:cs typeface="Consolas"/>
                 <a:sym typeface="Consolas"/>
               </a:rPr>
-              <a:t>s.forEach(element =&gt; { });</a:t>
+              <a:t>s.forEach(element =&gt; { })</a:t>
             </a:r>
             <a:endParaRPr sz="1750">
               <a:solidFill>
@@ -8359,12 +8504,102 @@
                 <a:cs typeface="Consolas"/>
                 <a:sym typeface="Consolas"/>
               </a:rPr>
-              <a:t>topScores.sort((a, b) =&gt;);</a:t>
-            </a:r>
-            <a:endParaRPr sz="1750">
+              <a:t>topScores.sort((a, b) =&gt;)</a:t>
+            </a:r>
+            <a:endParaRPr sz="1500">
               <a:solidFill>
-                <a:srgbClr val="1D1C1D"/>
+                <a:srgbClr val="188038"/>
               </a:solidFill>
+              <a:latin typeface="Consolas"/>
+              <a:ea typeface="Consolas"/>
+              <a:cs typeface="Consolas"/>
+              <a:sym typeface="Consolas"/>
+            </a:endParaRPr>
+          </a:p>
+          <a:p>
+            <a:pPr indent="-228600" lvl="0" marL="723900" rtl="0" algn="l">
+              <a:lnSpc>
+                <a:spcPct val="115000"/>
+              </a:lnSpc>
+              <a:spcBef>
+                <a:spcPts val="0"/>
+              </a:spcBef>
+              <a:spcAft>
+                <a:spcPts val="0"/>
+              </a:spcAft>
+              <a:buClr>
+                <a:srgbClr val="188038"/>
+              </a:buClr>
+              <a:buSzPts val="1500"/>
+              <a:buFont typeface="Consolas"/>
+              <a:buNone/>
+            </a:pPr>
+            <a:r>
+              <a:rPr lang="en" sz="1500">
+                <a:solidFill>
+                  <a:srgbClr val="188038"/>
+                </a:solidFill>
+                <a:latin typeface="Consolas"/>
+                <a:ea typeface="Consolas"/>
+                <a:cs typeface="Consolas"/>
+                <a:sym typeface="Consolas"/>
+              </a:rPr>
+              <a:t>JSON.parse()</a:t>
+            </a:r>
+            <a:br>
+              <a:rPr lang="en" sz="1500">
+                <a:solidFill>
+                  <a:srgbClr val="188038"/>
+                </a:solidFill>
+                <a:latin typeface="Consolas"/>
+                <a:ea typeface="Consolas"/>
+                <a:cs typeface="Consolas"/>
+                <a:sym typeface="Consolas"/>
+              </a:rPr>
+            </a:br>
+            <a:r>
+              <a:rPr lang="en" sz="1500">
+                <a:solidFill>
+                  <a:srgbClr val="188038"/>
+                </a:solidFill>
+                <a:latin typeface="Consolas"/>
+                <a:ea typeface="Consolas"/>
+                <a:cs typeface="Consolas"/>
+                <a:sym typeface="Consolas"/>
+              </a:rPr>
+              <a:t>localStorage.getItem("")</a:t>
+            </a:r>
+            <a:br>
+              <a:rPr lang="en" sz="1500">
+                <a:solidFill>
+                  <a:srgbClr val="188038"/>
+                </a:solidFill>
+                <a:latin typeface="Consolas"/>
+                <a:ea typeface="Consolas"/>
+                <a:cs typeface="Consolas"/>
+                <a:sym typeface="Consolas"/>
+              </a:rPr>
+            </a:br>
+            <a:r>
+              <a:rPr lang="en" sz="1500">
+                <a:solidFill>
+                  <a:srgbClr val="188038"/>
+                </a:solidFill>
+                <a:latin typeface="Consolas"/>
+                <a:ea typeface="Consolas"/>
+                <a:cs typeface="Consolas"/>
+                <a:sym typeface="Consolas"/>
+              </a:rPr>
+              <a:t>JSON.stringify()</a:t>
+            </a:r>
+            <a:endParaRPr sz="1500">
+              <a:solidFill>
+                <a:srgbClr val="188038"/>
+              </a:solidFill>
+              <a:latin typeface="Consolas"/>
+              <a:ea typeface="Consolas"/>
+              <a:cs typeface="Consolas"/>
+              <a:sym typeface="Consolas"/>
             </a:endParaRPr>
           </a:p>
         </p:txBody>
@@ -8379,7 +8614,7 @@
         </p:nvSpPr>
         <p:spPr>
           <a:xfrm>
-            <a:off x="311700" y="3625994"/>
+            <a:off x="311700" y="4242373"/>
             <a:ext cx="8520600" cy="454800"/>
           </a:xfrm>
           <a:prstGeom prst="rect">
@@ -9101,6 +9336,285 @@
 </file>
 
 <file path=ppt/theme/theme1.xml><?xml version="1.0" encoding="utf-8"?>
+<a:theme xmlns:a="http://schemas.openxmlformats.org/drawingml/2006/main" xmlns:r="http://schemas.openxmlformats.org/officeDocument/2006/relationships">
+  <a:themeElements>
+    <a:clrScheme name="Default">
+      <a:dk1>
+        <a:srgbClr val="000000"/>
+      </a:dk1>
+      <a:lt1>
+        <a:srgbClr val="FFFFFF"/>
+      </a:lt1>
+      <a:dk2>
+        <a:srgbClr val="158158"/>
+      </a:dk2>
+      <a:lt2>
+        <a:srgbClr val="F3F3F3"/>
+      </a:lt2>
+      <a:accent1>
+        <a:srgbClr val="058DC7"/>
+      </a:accent1>
+      <a:accent2>
+        <a:srgbClr val="50B432"/>
+      </a:accent2>
+      <a:accent3>
+        <a:srgbClr val="ED561B"/>
+      </a:accent3>
+      <a:accent4>
+        <a:srgbClr val="EDEF00"/>
+      </a:accent4>
+      <a:accent5>
+        <a:srgbClr val="24CBE5"/>
+      </a:accent5>
+      <a:accent6>
+        <a:srgbClr val="64E572"/>
+      </a:accent6>
+      <a:hlink>
+        <a:srgbClr val="2200CC"/>
+      </a:hlink>
+      <a:folHlink>
+        <a:srgbClr val="551A8B"/>
+      </a:folHlink>
+    </a:clrScheme>
+    <a:fontScheme name="Office">
+      <a:majorFont>
+        <a:latin typeface="Arial"/>
+        <a:ea typeface=""/>
+        <a:cs typeface=""/>
+        <a:font script="Jpan" typeface="ＭＳ Ｐゴシック"/>
+        <a:font script="Hang" typeface="맑은 고딕"/>
+        <a:font script="Hans" typeface="宋体"/>
+        <a:font script="Hant" typeface="新細明體"/>
+        <a:font script="Arab" typeface="Times New Roman"/>
+        <a:font script="Hebr" typeface="Times New Roman"/>
+        <a:font script="Thai" typeface="Angsana New"/>
+        <a:font script="Ethi" typeface="Nyala"/>
+        <a:font script="Beng" typeface="Vrinda"/>
+        <a:font script="Gujr" typeface="Shruti"/>
+        <a:font script="Khmr" typeface="MoolBoran"/>
+        <a:font script="Knda" typeface="Tunga"/>
+        <a:font script="Guru" typeface="Raavi"/>
+        <a:font script="Cans" typeface="Euphemia"/>
+        <a:font script="Cher" typeface="Plantagenet Cherokee"/>
+        <a:font script="Yiii" typeface="Microsoft Yi Baiti"/>
+        <a:font script="Tibt" typeface="Microsoft Himalaya"/>
+        <a:font script="Thaa" typeface="MV Boli"/>
+        <a:font script="Deva" typeface="Mangal"/>
+        <a:font script="Telu" typeface="Gautami"/>
+        <a:font script="Taml" typeface="Latha"/>
+        <a:font script="Syrc" typeface="Estrangelo Edessa"/>
+        <a:font script="Orya" typeface="Kalinga"/>
+        <a:font script="Mlym" typeface="Kartika"/>
+        <a:font script="Laoo" typeface="DokChampa"/>
+        <a:font script="Sinh" typeface="Iskoola Pota"/>
+        <a:font script="Mong" typeface="Mongolian Baiti"/>
+        <a:font script="Viet" typeface="Times New Roman"/>
+        <a:font script="Uigh" typeface="Microsoft Uighur"/>
+        <a:font script="Geor" typeface="Sylfaen"/>
+      </a:majorFont>
+      <a:minorFont>
+        <a:latin typeface="Arial"/>
+        <a:ea typeface=""/>
+        <a:cs typeface=""/>
+        <a:font script="Jpan" typeface="ＭＳ Ｐゴシック"/>
+        <a:font script="Hang" typeface="맑은 고딕"/>
+        <a:font script="Hans" typeface="宋体"/>
+        <a:font script="Hant" typeface="新細明體"/>
+        <a:font script="Arab" typeface="Arial"/>
+        <a:font script="Hebr" typeface="Arial"/>
+        <a:font script="Thai" typeface="Cordia New"/>
+        <a:font script="Ethi" typeface="Nyala"/>
+        <a:font script="Beng" typeface="Vrinda"/>
+        <a:font script="Gujr" typeface="Shruti"/>
+        <a:font script="Khmr" typeface="DaunPenh"/>
+        <a:font script="Knda" typeface="Tunga"/>
+        <a:font script="Guru" typeface="Raavi"/>
+        <a:font script="Cans" typeface="Euphemia"/>
+        <a:font script="Cher" typeface="Plantagenet Cherokee"/>
+        <a:font script="Yiii" typeface="Microsoft Yi Baiti"/>
+        <a:font script="Tibt" typeface="Microsoft Himalaya"/>
+        <a:font script="Thaa" typeface="MV Boli"/>
+        <a:font script="Deva" typeface="Mangal"/>
+        <a:font script="Telu" typeface="Gautami"/>
+        <a:font script="Taml" typeface="Latha"/>
+        <a:font script="Syrc" typeface="Estrangelo Edessa"/>
+        <a:font script="Orya" typeface="Kalinga"/>
+        <a:font script="Mlym" typeface="Kartika"/>
+        <a:font script="Laoo" typeface="DokChampa"/>
+        <a:font script="Sinh" typeface="Iskoola Pota"/>
+        <a:font script="Mong" typeface="Mongolian Baiti"/>
+        <a:font script="Viet" typeface="Arial"/>
+        <a:font script="Uigh" typeface="Microsoft Uighur"/>
+        <a:font script="Geor" typeface="Sylfaen"/>
+      </a:minorFont>
+    </a:fontScheme>
+    <a:fmtScheme name="Office">
+      <a:fillStyleLst>
+        <a:solidFill>
+          <a:schemeClr val="phClr"/>
+        </a:solidFill>
+        <a:gradFill rotWithShape="1">
+          <a:gsLst>
+            <a:gs pos="0">
+              <a:schemeClr val="phClr">
+                <a:tint val="50000"/>
+                <a:satMod val="300000"/>
+              </a:schemeClr>
+            </a:gs>
+            <a:gs pos="35000">
+              <a:schemeClr val="phClr">
+                <a:tint val="37000"/>
+                <a:satMod val="300000"/>
+              </a:schemeClr>
+            </a:gs>
+            <a:gs pos="100000">
+              <a:schemeClr val="phClr">
+                <a:tint val="15000"/>
+                <a:satMod val="350000"/>
+              </a:schemeClr>
+            </a:gs>
+          </a:gsLst>
+          <a:lin ang="16200000" scaled="1"/>
+        </a:gradFill>
+        <a:gradFill rotWithShape="1">
+          <a:gsLst>
+            <a:gs pos="0">
+              <a:schemeClr val="phClr">
+                <a:tint val="100000"/>
+                <a:shade val="100000"/>
+                <a:satMod val="130000"/>
+              </a:schemeClr>
+            </a:gs>
+            <a:gs pos="100000">
+              <a:schemeClr val="phClr">
+                <a:tint val="50000"/>
+                <a:shade val="100000"/>
+                <a:satMod val="350000"/>
+              </a:schemeClr>
+            </a:gs>
+          </a:gsLst>
+          <a:lin ang="16200000" scaled="0"/>
+        </a:gradFill>
+      </a:fillStyleLst>
+      <a:lnStyleLst>
+        <a:ln w="9525" cap="flat" cmpd="sng" algn="ctr">
+          <a:solidFill>
+            <a:schemeClr val="phClr">
+              <a:shade val="95000"/>
+              <a:satMod val="105000"/>
+            </a:schemeClr>
+          </a:solidFill>
+          <a:prstDash val="solid"/>
+        </a:ln>
+        <a:ln w="25400" cap="flat" cmpd="sng" algn="ctr">
+          <a:solidFill>
+            <a:schemeClr val="phClr"/>
+          </a:solidFill>
+          <a:prstDash val="solid"/>
+        </a:ln>
+        <a:ln w="38100" cap="flat" cmpd="sng" algn="ctr">
+          <a:solidFill>
+            <a:schemeClr val="phClr"/>
+          </a:solidFill>
+          <a:prstDash val="solid"/>
+        </a:ln>
+      </a:lnStyleLst>
+      <a:effectStyleLst>
+        <a:effectStyle>
+          <a:effectLst>
+            <a:outerShdw blurRad="40000" dist="20000" dir="5400000" rotWithShape="0">
+              <a:srgbClr val="000000">
+                <a:alpha val="38000"/>
+              </a:srgbClr>
+            </a:outerShdw>
+          </a:effectLst>
+        </a:effectStyle>
+        <a:effectStyle>
+          <a:effectLst>
+            <a:outerShdw blurRad="40000" dist="23000" dir="5400000" rotWithShape="0">
+              <a:srgbClr val="000000">
+                <a:alpha val="35000"/>
+              </a:srgbClr>
+            </a:outerShdw>
+          </a:effectLst>
+        </a:effectStyle>
+        <a:effectStyle>
+          <a:effectLst>
+            <a:outerShdw blurRad="40000" dist="23000" dir="5400000" rotWithShape="0">
+              <a:srgbClr val="000000">
+                <a:alpha val="35000"/>
+              </a:srgbClr>
+            </a:outerShdw>
+          </a:effectLst>
+          <a:scene3d>
+            <a:camera prst="orthographicFront">
+              <a:rot lat="0" lon="0" rev="0"/>
+            </a:camera>
+            <a:lightRig rig="threePt" dir="t">
+              <a:rot lat="0" lon="0" rev="1200000"/>
+            </a:lightRig>
+          </a:scene3d>
+          <a:sp3d>
+            <a:bevelT w="63500" h="25400"/>
+          </a:sp3d>
+        </a:effectStyle>
+      </a:effectStyleLst>
+      <a:bgFillStyleLst>
+        <a:solidFill>
+          <a:schemeClr val="phClr"/>
+        </a:solidFill>
+        <a:gradFill rotWithShape="1">
+          <a:gsLst>
+            <a:gs pos="0">
+              <a:schemeClr val="phClr">
+                <a:tint val="40000"/>
+                <a:satMod val="350000"/>
+              </a:schemeClr>
+            </a:gs>
+            <a:gs pos="40000">
+              <a:schemeClr val="phClr">
+                <a:tint val="45000"/>
+                <a:shade val="99000"/>
+                <a:satMod val="350000"/>
+              </a:schemeClr>
+            </a:gs>
+            <a:gs pos="100000">
+              <a:schemeClr val="phClr">
+                <a:shade val="20000"/>
+                <a:satMod val="255000"/>
+              </a:schemeClr>
+            </a:gs>
+          </a:gsLst>
+          <a:path path="circle">
+            <a:fillToRect l="50000" t="-80000" r="50000" b="180000"/>
+          </a:path>
+        </a:gradFill>
+        <a:gradFill rotWithShape="1">
+          <a:gsLst>
+            <a:gs pos="0">
+              <a:schemeClr val="phClr">
+                <a:tint val="80000"/>
+                <a:satMod val="300000"/>
+              </a:schemeClr>
+            </a:gs>
+            <a:gs pos="100000">
+              <a:schemeClr val="phClr">
+                <a:shade val="30000"/>
+                <a:satMod val="200000"/>
+              </a:schemeClr>
+            </a:gs>
+          </a:gsLst>
+          <a:path path="circle">
+            <a:fillToRect l="50000" t="50000" r="50000" b="50000"/>
+          </a:path>
+        </a:gradFill>
+      </a:bgFillStyleLst>
+    </a:fmtScheme>
+  </a:themeElements>
+</a:theme>
+</file>
+
+<file path=ppt/theme/theme2.xml><?xml version="1.0" encoding="utf-8"?>
 <a:theme xmlns:a="http://schemas.openxmlformats.org/drawingml/2006/main" xmlns:r="http://schemas.openxmlformats.org/officeDocument/2006/relationships" name="Simple Dark">
   <a:themeElements>
     <a:clrScheme name="Simple Dark">
@@ -9377,283 +9891,4 @@
     </a:fmtScheme>
   </a:themeElements>
 </a:theme>
-</file>
-
-<file path=ppt/theme/theme2.xml><?xml version="1.0" encoding="utf-8"?>
-<a:theme xmlns:a="http://schemas.openxmlformats.org/drawingml/2006/main" xmlns:r="http://schemas.openxmlformats.org/officeDocument/2006/relationships">
-  <a:themeElements>
-    <a:clrScheme name="Default">
-      <a:dk1>
-        <a:srgbClr val="000000"/>
-      </a:dk1>
-      <a:lt1>
-        <a:srgbClr val="FFFFFF"/>
-      </a:lt1>
-      <a:dk2>
-        <a:srgbClr val="158158"/>
-      </a:dk2>
-      <a:lt2>
-        <a:srgbClr val="F3F3F3"/>
-      </a:lt2>
-      <a:accent1>
-        <a:srgbClr val="058DC7"/>
-      </a:accent1>
-      <a:accent2>
-        <a:srgbClr val="50B432"/>
-      </a:accent2>
-      <a:accent3>
-        <a:srgbClr val="ED561B"/>
-      </a:accent3>
-      <a:accent4>
-        <a:srgbClr val="EDEF00"/>
-      </a:accent4>
-      <a:accent5>
-        <a:srgbClr val="24CBE5"/>
-      </a:accent5>
-      <a:accent6>
-        <a:srgbClr val="64E572"/>
-      </a:accent6>
-      <a:hlink>
-        <a:srgbClr val="2200CC"/>
-      </a:hlink>
-      <a:folHlink>
-        <a:srgbClr val="551A8B"/>
-      </a:folHlink>
-    </a:clrScheme>
-    <a:fontScheme name="Office">
-      <a:majorFont>
-        <a:latin typeface="Arial"/>
-        <a:ea typeface=""/>
-        <a:cs typeface=""/>
-        <a:font script="Jpan" typeface="ＭＳ Ｐゴシック"/>
-        <a:font script="Hang" typeface="맑은 고딕"/>
-        <a:font script="Hans" typeface="宋体"/>
-        <a:font script="Hant" typeface="新細明體"/>
-        <a:font script="Arab" typeface="Times New Roman"/>
-        <a:font script="Hebr" typeface="Times New Roman"/>
-        <a:font script="Thai" typeface="Angsana New"/>
-        <a:font script="Ethi" typeface="Nyala"/>
-        <a:font script="Beng" typeface="Vrinda"/>
-        <a:font script="Gujr" typeface="Shruti"/>
-        <a:font script="Khmr" typeface="MoolBoran"/>
-        <a:font script="Knda" typeface="Tunga"/>
-        <a:font script="Guru" typeface="Raavi"/>
-        <a:font script="Cans" typeface="Euphemia"/>
-        <a:font script="Cher" typeface="Plantagenet Cherokee"/>
-        <a:font script="Yiii" typeface="Microsoft Yi Baiti"/>
-        <a:font script="Tibt" typeface="Microsoft Himalaya"/>
-        <a:font script="Thaa" typeface="MV Boli"/>
-        <a:font script="Deva" typeface="Mangal"/>
-        <a:font script="Telu" typeface="Gautami"/>
-        <a:font script="Taml" typeface="Latha"/>
-        <a:font script="Syrc" typeface="Estrangelo Edessa"/>
-        <a:font script="Orya" typeface="Kalinga"/>
-        <a:font script="Mlym" typeface="Kartika"/>
-        <a:font script="Laoo" typeface="DokChampa"/>
-        <a:font script="Sinh" typeface="Iskoola Pota"/>
-        <a:font script="Mong" typeface="Mongolian Baiti"/>
-        <a:font script="Viet" typeface="Times New Roman"/>
-        <a:font script="Uigh" typeface="Microsoft Uighur"/>
-        <a:font script="Geor" typeface="Sylfaen"/>
-      </a:majorFont>
-      <a:minorFont>
-        <a:latin typeface="Arial"/>
-        <a:ea typeface=""/>
-        <a:cs typeface=""/>
-        <a:font script="Jpan" typeface="ＭＳ Ｐゴシック"/>
-        <a:font script="Hang" typeface="맑은 고딕"/>
-        <a:font script="Hans" typeface="宋体"/>
-        <a:font script="Hant" typeface="新細明體"/>
-        <a:font script="Arab" typeface="Arial"/>
-        <a:font script="Hebr" typeface="Arial"/>
-        <a:font script="Thai" typeface="Cordia New"/>
-        <a:font script="Ethi" typeface="Nyala"/>
-        <a:font script="Beng" typeface="Vrinda"/>
-        <a:font script="Gujr" typeface="Shruti"/>
-        <a:font script="Khmr" typeface="DaunPenh"/>
-        <a:font script="Knda" typeface="Tunga"/>
-        <a:font script="Guru" typeface="Raavi"/>
-        <a:font script="Cans" typeface="Euphemia"/>
-        <a:font script="Cher" typeface="Plantagenet Cherokee"/>
-        <a:font script="Yiii" typeface="Microsoft Yi Baiti"/>
-        <a:font script="Tibt" typeface="Microsoft Himalaya"/>
-        <a:font script="Thaa" typeface="MV Boli"/>
-        <a:font script="Deva" typeface="Mangal"/>
-        <a:font script="Telu" typeface="Gautami"/>
-        <a:font script="Taml" typeface="Latha"/>
-        <a:font script="Syrc" typeface="Estrangelo Edessa"/>
-        <a:font script="Orya" typeface="Kalinga"/>
-        <a:font script="Mlym" typeface="Kartika"/>
-        <a:font script="Laoo" typeface="DokChampa"/>
-        <a:font script="Sinh" typeface="Iskoola Pota"/>
-        <a:font script="Mong" typeface="Mongolian Baiti"/>
-        <a:font script="Viet" typeface="Arial"/>
-        <a:font script="Uigh" typeface="Microsoft Uighur"/>
-        <a:font script="Geor" typeface="Sylfaen"/>
-      </a:minorFont>
-    </a:fontScheme>
-    <a:fmtScheme name="Office">
-      <a:fillStyleLst>
-        <a:solidFill>
-          <a:schemeClr val="phClr"/>
-        </a:solidFill>
-        <a:gradFill rotWithShape="1">
-          <a:gsLst>
-            <a:gs pos="0">
-              <a:schemeClr val="phClr">
-                <a:tint val="50000"/>
-                <a:satMod val="300000"/>
-              </a:schemeClr>
-            </a:gs>
-            <a:gs pos="35000">
-              <a:schemeClr val="phClr">
-                <a:tint val="37000"/>
-                <a:satMod val="300000"/>
-              </a:schemeClr>
-            </a:gs>
-            <a:gs pos="100000">
-              <a:schemeClr val="phClr">
-                <a:tint val="15000"/>
-                <a:satMod val="350000"/>
-              </a:schemeClr>
-            </a:gs>
-          </a:gsLst>
-          <a:lin ang="16200000" scaled="1"/>
-        </a:gradFill>
-        <a:gradFill rotWithShape="1">
-          <a:gsLst>
-            <a:gs pos="0">
-              <a:schemeClr val="phClr">
-                <a:tint val="100000"/>
-                <a:shade val="100000"/>
-                <a:satMod val="130000"/>
-              </a:schemeClr>
-            </a:gs>
-            <a:gs pos="100000">
-              <a:schemeClr val="phClr">
-                <a:tint val="50000"/>
-                <a:shade val="100000"/>
-                <a:satMod val="350000"/>
-              </a:schemeClr>
-            </a:gs>
-          </a:gsLst>
-          <a:lin ang="16200000" scaled="0"/>
-        </a:gradFill>
-      </a:fillStyleLst>
-      <a:lnStyleLst>
-        <a:ln w="9525" cap="flat" cmpd="sng" algn="ctr">
-          <a:solidFill>
-            <a:schemeClr val="phClr">
-              <a:shade val="95000"/>
-              <a:satMod val="105000"/>
-            </a:schemeClr>
-          </a:solidFill>
-          <a:prstDash val="solid"/>
-        </a:ln>
-        <a:ln w="25400" cap="flat" cmpd="sng" algn="ctr">
-          <a:solidFill>
-            <a:schemeClr val="phClr"/>
-          </a:solidFill>
-          <a:prstDash val="solid"/>
-        </a:ln>
-        <a:ln w="38100" cap="flat" cmpd="sng" algn="ctr">
-          <a:solidFill>
-            <a:schemeClr val="phClr"/>
-          </a:solidFill>
-          <a:prstDash val="solid"/>
-        </a:ln>
-      </a:lnStyleLst>
-      <a:effectStyleLst>
-        <a:effectStyle>
-          <a:effectLst>
-            <a:outerShdw blurRad="40000" dist="20000" dir="5400000" rotWithShape="0">
-              <a:srgbClr val="000000">
-                <a:alpha val="38000"/>
-              </a:srgbClr>
-            </a:outerShdw>
-          </a:effectLst>
-        </a:effectStyle>
-        <a:effectStyle>
-          <a:effectLst>
-            <a:outerShdw blurRad="40000" dist="23000" dir="5400000" rotWithShape="0">
-              <a:srgbClr val="000000">
-                <a:alpha val="35000"/>
-              </a:srgbClr>
-            </a:outerShdw>
-          </a:effectLst>
-        </a:effectStyle>
-        <a:effectStyle>
-          <a:effectLst>
-            <a:outerShdw blurRad="40000" dist="23000" dir="5400000" rotWithShape="0">
-              <a:srgbClr val="000000">
-                <a:alpha val="35000"/>
-              </a:srgbClr>
-            </a:outerShdw>
-          </a:effectLst>
-          <a:scene3d>
-            <a:camera prst="orthographicFront">
-              <a:rot lat="0" lon="0" rev="0"/>
-            </a:camera>
-            <a:lightRig rig="threePt" dir="t">
-              <a:rot lat="0" lon="0" rev="1200000"/>
-            </a:lightRig>
-          </a:scene3d>
-          <a:sp3d>
-            <a:bevelT w="63500" h="25400"/>
-          </a:sp3d>
-        </a:effectStyle>
-      </a:effectStyleLst>
-      <a:bgFillStyleLst>
-        <a:solidFill>
-          <a:schemeClr val="phClr"/>
-        </a:solidFill>
-        <a:gradFill rotWithShape="1">
-          <a:gsLst>
-            <a:gs pos="0">
-              <a:schemeClr val="phClr">
-                <a:tint val="40000"/>
-                <a:satMod val="350000"/>
-              </a:schemeClr>
-            </a:gs>
-            <a:gs pos="40000">
-              <a:schemeClr val="phClr">
-                <a:tint val="45000"/>
-                <a:shade val="99000"/>
-                <a:satMod val="350000"/>
-              </a:schemeClr>
-            </a:gs>
-            <a:gs pos="100000">
-              <a:schemeClr val="phClr">
-                <a:shade val="20000"/>
-                <a:satMod val="255000"/>
-              </a:schemeClr>
-            </a:gs>
-          </a:gsLst>
-          <a:path path="circle">
-            <a:fillToRect l="50000" t="-80000" r="50000" b="180000"/>
-          </a:path>
-        </a:gradFill>
-        <a:gradFill rotWithShape="1">
-          <a:gsLst>
-            <a:gs pos="0">
-              <a:schemeClr val="phClr">
-                <a:tint val="80000"/>
-                <a:satMod val="300000"/>
-              </a:schemeClr>
-            </a:gs>
-            <a:gs pos="100000">
-              <a:schemeClr val="phClr">
-                <a:shade val="30000"/>
-                <a:satMod val="200000"/>
-              </a:schemeClr>
-            </a:gs>
-          </a:gsLst>
-          <a:path path="circle">
-            <a:fillToRect l="50000" t="50000" r="50000" b="50000"/>
-          </a:path>
-        </a:gradFill>
-      </a:bgFillStyleLst>
-    </a:fmtScheme>
-  </a:themeElements>
-</a:theme>
 </file>
</xml_diff>